<commit_message>
Pig udfs and scripts and some log4j prop
</commit_message>
<xml_diff>
--- a/es.pptx
+++ b/es.pptx
@@ -22,24 +22,25 @@
     <p:sldId id="271" r:id="rId16"/>
     <p:sldId id="270" r:id="rId17"/>
     <p:sldId id="291" r:id="rId18"/>
-    <p:sldId id="281" r:id="rId19"/>
-    <p:sldId id="258" r:id="rId20"/>
-    <p:sldId id="282" r:id="rId21"/>
-    <p:sldId id="283" r:id="rId22"/>
-    <p:sldId id="284" r:id="rId23"/>
-    <p:sldId id="285" r:id="rId24"/>
-    <p:sldId id="286" r:id="rId25"/>
-    <p:sldId id="288" r:id="rId26"/>
-    <p:sldId id="289" r:id="rId27"/>
-    <p:sldId id="290" r:id="rId28"/>
-    <p:sldId id="287" r:id="rId29"/>
-    <p:sldId id="259" r:id="rId30"/>
-    <p:sldId id="263" r:id="rId31"/>
-    <p:sldId id="264" r:id="rId32"/>
-    <p:sldId id="265" r:id="rId33"/>
-    <p:sldId id="266" r:id="rId34"/>
-    <p:sldId id="261" r:id="rId35"/>
-    <p:sldId id="260" r:id="rId36"/>
+    <p:sldId id="292" r:id="rId19"/>
+    <p:sldId id="281" r:id="rId20"/>
+    <p:sldId id="258" r:id="rId21"/>
+    <p:sldId id="282" r:id="rId22"/>
+    <p:sldId id="283" r:id="rId23"/>
+    <p:sldId id="284" r:id="rId24"/>
+    <p:sldId id="285" r:id="rId25"/>
+    <p:sldId id="286" r:id="rId26"/>
+    <p:sldId id="288" r:id="rId27"/>
+    <p:sldId id="289" r:id="rId28"/>
+    <p:sldId id="290" r:id="rId29"/>
+    <p:sldId id="287" r:id="rId30"/>
+    <p:sldId id="259" r:id="rId31"/>
+    <p:sldId id="263" r:id="rId32"/>
+    <p:sldId id="264" r:id="rId33"/>
+    <p:sldId id="265" r:id="rId34"/>
+    <p:sldId id="266" r:id="rId35"/>
+    <p:sldId id="261" r:id="rId36"/>
+    <p:sldId id="260" r:id="rId37"/>
   </p:sldIdLst>
   <p:sldSz cx="9144000" cy="6858000" type="screen4x3"/>
   <p:notesSz cx="6858000" cy="9144000"/>
@@ -3834,6 +3835,18 @@
           <a:bodyPr/>
           <a:lstStyle/>
           <a:p>
+            <a:r>
+              <a:rPr lang="en-US" dirty="0" smtClean="0"/>
+              <a:t>Facets – aggregators, designed to </a:t>
+            </a:r>
+            <a:r>
+              <a:rPr lang="en-US" smtClean="0"/>
+              <a:t>narrow down </a:t>
+            </a:r>
+            <a:r>
+              <a:rPr lang="en-US" dirty="0" smtClean="0"/>
+              <a:t>your search category.</a:t>
+            </a:r>
             <a:endParaRPr lang="en-US" dirty="0"/>
           </a:p>
         </p:txBody>
@@ -4283,6 +4296,82 @@
           <a:p>
             <a:r>
               <a:rPr lang="en-US" dirty="0" err="1" smtClean="0"/>
+              <a:t>Lucene</a:t>
+            </a:r>
+            <a:r>
+              <a:rPr lang="en-US" dirty="0" smtClean="0"/>
+              <a:t> Query. Syntax.</a:t>
+            </a:r>
+            <a:endParaRPr lang="en-US" dirty="0"/>
+          </a:p>
+        </p:txBody>
+      </p:sp>
+      <p:sp>
+        <p:nvSpPr>
+          <p:cNvPr id="3" name="Content Placeholder 2"/>
+          <p:cNvSpPr>
+            <a:spLocks noGrp="1"/>
+          </p:cNvSpPr>
+          <p:nvPr>
+            <p:ph sz="quarter" idx="13"/>
+          </p:nvPr>
+        </p:nvSpPr>
+        <p:spPr/>
+        <p:txBody>
+          <a:bodyPr/>
+          <a:lstStyle/>
+          <a:p>
+            <a:endParaRPr lang="en-US"/>
+          </a:p>
+        </p:txBody>
+      </p:sp>
+    </p:spTree>
+    <p:extLst>
+      <p:ext uri="{BB962C8B-B14F-4D97-AF65-F5344CB8AC3E}">
+        <p14:creationId xmlns:p14="http://schemas.microsoft.com/office/powerpoint/2010/main" val="3260371707"/>
+      </p:ext>
+    </p:extLst>
+  </p:cSld>
+  <p:clrMapOvr>
+    <a:masterClrMapping/>
+  </p:clrMapOvr>
+</p:sld>
+</file>
+
+<file path=ppt/slides/slide19.xml><?xml version="1.0" encoding="utf-8"?>
+<p:sld xmlns:a="http://schemas.openxmlformats.org/drawingml/2006/main" xmlns:r="http://schemas.openxmlformats.org/officeDocument/2006/relationships" xmlns:p="http://schemas.openxmlformats.org/presentationml/2006/main">
+  <p:cSld>
+    <p:spTree>
+      <p:nvGrpSpPr>
+        <p:cNvPr id="1" name=""/>
+        <p:cNvGrpSpPr/>
+        <p:nvPr/>
+      </p:nvGrpSpPr>
+      <p:grpSpPr>
+        <a:xfrm>
+          <a:off x="0" y="0"/>
+          <a:ext cx="0" cy="0"/>
+          <a:chOff x="0" y="0"/>
+          <a:chExt cx="0" cy="0"/>
+        </a:xfrm>
+      </p:grpSpPr>
+      <p:sp>
+        <p:nvSpPr>
+          <p:cNvPr id="2" name="Title 1"/>
+          <p:cNvSpPr>
+            <a:spLocks noGrp="1"/>
+          </p:cNvSpPr>
+          <p:nvPr>
+            <p:ph type="title"/>
+          </p:nvPr>
+        </p:nvSpPr>
+        <p:spPr/>
+        <p:txBody>
+          <a:bodyPr/>
+          <a:lstStyle/>
+          <a:p>
+            <a:r>
+              <a:rPr lang="en-US" dirty="0" err="1" smtClean="0"/>
               <a:t>BigDesk</a:t>
             </a:r>
             <a:r>
@@ -4325,7 +4414,128 @@
 </p:sld>
 </file>
 
-<file path=ppt/slides/slide19.xml><?xml version="1.0" encoding="utf-8"?>
+<file path=ppt/slides/slide2.xml><?xml version="1.0" encoding="utf-8"?>
+<p:sld xmlns:a="http://schemas.openxmlformats.org/drawingml/2006/main" xmlns:r="http://schemas.openxmlformats.org/officeDocument/2006/relationships" xmlns:p="http://schemas.openxmlformats.org/presentationml/2006/main">
+  <p:cSld>
+    <p:spTree>
+      <p:nvGrpSpPr>
+        <p:cNvPr id="1" name=""/>
+        <p:cNvGrpSpPr/>
+        <p:nvPr/>
+      </p:nvGrpSpPr>
+      <p:grpSpPr>
+        <a:xfrm>
+          <a:off x="0" y="0"/>
+          <a:ext cx="0" cy="0"/>
+          <a:chOff x="0" y="0"/>
+          <a:chExt cx="0" cy="0"/>
+        </a:xfrm>
+      </p:grpSpPr>
+      <p:sp>
+        <p:nvSpPr>
+          <p:cNvPr id="2" name="Title 1"/>
+          <p:cNvSpPr>
+            <a:spLocks noGrp="1"/>
+          </p:cNvSpPr>
+          <p:nvPr>
+            <p:ph type="title"/>
+          </p:nvPr>
+        </p:nvSpPr>
+        <p:spPr/>
+        <p:txBody>
+          <a:bodyPr/>
+          <a:lstStyle/>
+          <a:p>
+            <a:r>
+              <a:rPr lang="en-US" dirty="0" smtClean="0"/>
+              <a:t>Buzz </a:t>
+            </a:r>
+            <a:r>
+              <a:rPr lang="en-US" dirty="0" err="1" smtClean="0"/>
+              <a:t>WordS</a:t>
+            </a:r>
+            <a:r>
+              <a:rPr lang="en-US" dirty="0" smtClean="0"/>
+              <a:t>.</a:t>
+            </a:r>
+            <a:endParaRPr lang="en-US" dirty="0"/>
+          </a:p>
+        </p:txBody>
+      </p:sp>
+      <p:sp>
+        <p:nvSpPr>
+          <p:cNvPr id="3" name="Content Placeholder 2"/>
+          <p:cNvSpPr>
+            <a:spLocks noGrp="1"/>
+          </p:cNvSpPr>
+          <p:nvPr>
+            <p:ph sz="quarter" idx="13"/>
+          </p:nvPr>
+        </p:nvSpPr>
+        <p:spPr/>
+        <p:txBody>
+          <a:bodyPr/>
+          <a:lstStyle/>
+          <a:p>
+            <a:r>
+              <a:rPr lang="en-US" dirty="0" smtClean="0"/>
+              <a:t>Open Source</a:t>
+            </a:r>
+          </a:p>
+          <a:p>
+            <a:r>
+              <a:rPr lang="en-US" dirty="0" smtClean="0"/>
+              <a:t>JSON</a:t>
+            </a:r>
+          </a:p>
+          <a:p>
+            <a:r>
+              <a:rPr lang="en-US" dirty="0" smtClean="0"/>
+              <a:t>Rest</a:t>
+            </a:r>
+          </a:p>
+          <a:p>
+            <a:r>
+              <a:rPr lang="en-US" dirty="0" smtClean="0"/>
+              <a:t>Http</a:t>
+            </a:r>
+          </a:p>
+          <a:p>
+            <a:r>
+              <a:rPr lang="en-US" dirty="0" err="1" smtClean="0"/>
+              <a:t>Lucene</a:t>
+            </a:r>
+            <a:endParaRPr lang="en-US" dirty="0" smtClean="0"/>
+          </a:p>
+          <a:p>
+            <a:r>
+              <a:rPr lang="en-US" dirty="0" smtClean="0"/>
+              <a:t>Distributed Data Store</a:t>
+            </a:r>
+          </a:p>
+          <a:p>
+            <a:r>
+              <a:rPr lang="en-US" dirty="0" smtClean="0"/>
+              <a:t>Very good for Searching and Analyzing Data</a:t>
+            </a:r>
+            <a:endParaRPr lang="en-US" dirty="0"/>
+          </a:p>
+        </p:txBody>
+      </p:sp>
+    </p:spTree>
+    <p:extLst>
+      <p:ext uri="{BB962C8B-B14F-4D97-AF65-F5344CB8AC3E}">
+        <p14:creationId xmlns:p14="http://schemas.microsoft.com/office/powerpoint/2010/main" val="3199174025"/>
+      </p:ext>
+    </p:extLst>
+  </p:cSld>
+  <p:clrMapOvr>
+    <a:masterClrMapping/>
+  </p:clrMapOvr>
+</p:sld>
+</file>
+
+<file path=ppt/slides/slide20.xml><?xml version="1.0" encoding="utf-8"?>
 <p:sld xmlns:a="http://schemas.openxmlformats.org/drawingml/2006/main" xmlns:r="http://schemas.openxmlformats.org/officeDocument/2006/relationships" xmlns:p="http://schemas.openxmlformats.org/presentationml/2006/main">
   <p:cSld>
     <p:spTree>
@@ -4431,205 +4641,6 @@
 </p:sld>
 </file>
 
-<file path=ppt/slides/slide2.xml><?xml version="1.0" encoding="utf-8"?>
-<p:sld xmlns:a="http://schemas.openxmlformats.org/drawingml/2006/main" xmlns:r="http://schemas.openxmlformats.org/officeDocument/2006/relationships" xmlns:p="http://schemas.openxmlformats.org/presentationml/2006/main">
-  <p:cSld>
-    <p:spTree>
-      <p:nvGrpSpPr>
-        <p:cNvPr id="1" name=""/>
-        <p:cNvGrpSpPr/>
-        <p:nvPr/>
-      </p:nvGrpSpPr>
-      <p:grpSpPr>
-        <a:xfrm>
-          <a:off x="0" y="0"/>
-          <a:ext cx="0" cy="0"/>
-          <a:chOff x="0" y="0"/>
-          <a:chExt cx="0" cy="0"/>
-        </a:xfrm>
-      </p:grpSpPr>
-      <p:sp>
-        <p:nvSpPr>
-          <p:cNvPr id="2" name="Title 1"/>
-          <p:cNvSpPr>
-            <a:spLocks noGrp="1"/>
-          </p:cNvSpPr>
-          <p:nvPr>
-            <p:ph type="title"/>
-          </p:nvPr>
-        </p:nvSpPr>
-        <p:spPr/>
-        <p:txBody>
-          <a:bodyPr/>
-          <a:lstStyle/>
-          <a:p>
-            <a:r>
-              <a:rPr lang="en-US" dirty="0" smtClean="0"/>
-              <a:t>Buzz </a:t>
-            </a:r>
-            <a:r>
-              <a:rPr lang="en-US" dirty="0" err="1" smtClean="0"/>
-              <a:t>WordS</a:t>
-            </a:r>
-            <a:r>
-              <a:rPr lang="en-US" dirty="0" smtClean="0"/>
-              <a:t>.</a:t>
-            </a:r>
-            <a:endParaRPr lang="en-US" dirty="0"/>
-          </a:p>
-        </p:txBody>
-      </p:sp>
-      <p:sp>
-        <p:nvSpPr>
-          <p:cNvPr id="3" name="Content Placeholder 2"/>
-          <p:cNvSpPr>
-            <a:spLocks noGrp="1"/>
-          </p:cNvSpPr>
-          <p:nvPr>
-            <p:ph sz="quarter" idx="13"/>
-          </p:nvPr>
-        </p:nvSpPr>
-        <p:spPr/>
-        <p:txBody>
-          <a:bodyPr/>
-          <a:lstStyle/>
-          <a:p>
-            <a:r>
-              <a:rPr lang="en-US" dirty="0" smtClean="0"/>
-              <a:t>Open Source</a:t>
-            </a:r>
-          </a:p>
-          <a:p>
-            <a:r>
-              <a:rPr lang="en-US" dirty="0" smtClean="0"/>
-              <a:t>JSON</a:t>
-            </a:r>
-          </a:p>
-          <a:p>
-            <a:r>
-              <a:rPr lang="en-US" dirty="0" smtClean="0"/>
-              <a:t>Rest</a:t>
-            </a:r>
-          </a:p>
-          <a:p>
-            <a:r>
-              <a:rPr lang="en-US" dirty="0" smtClean="0"/>
-              <a:t>Http</a:t>
-            </a:r>
-          </a:p>
-          <a:p>
-            <a:r>
-              <a:rPr lang="en-US" dirty="0" err="1" smtClean="0"/>
-              <a:t>Lucene</a:t>
-            </a:r>
-            <a:endParaRPr lang="en-US" dirty="0" smtClean="0"/>
-          </a:p>
-          <a:p>
-            <a:r>
-              <a:rPr lang="en-US" dirty="0" smtClean="0"/>
-              <a:t>Distributed Data Store</a:t>
-            </a:r>
-          </a:p>
-          <a:p>
-            <a:r>
-              <a:rPr lang="en-US" dirty="0" smtClean="0"/>
-              <a:t>Very good for Searching and Analyzing Data</a:t>
-            </a:r>
-            <a:endParaRPr lang="en-US" dirty="0"/>
-          </a:p>
-        </p:txBody>
-      </p:sp>
-    </p:spTree>
-    <p:extLst>
-      <p:ext uri="{BB962C8B-B14F-4D97-AF65-F5344CB8AC3E}">
-        <p14:creationId xmlns:p14="http://schemas.microsoft.com/office/powerpoint/2010/main" val="3199174025"/>
-      </p:ext>
-    </p:extLst>
-  </p:cSld>
-  <p:clrMapOvr>
-    <a:masterClrMapping/>
-  </p:clrMapOvr>
-</p:sld>
-</file>
-
-<file path=ppt/slides/slide20.xml><?xml version="1.0" encoding="utf-8"?>
-<p:sld xmlns:a="http://schemas.openxmlformats.org/drawingml/2006/main" xmlns:r="http://schemas.openxmlformats.org/officeDocument/2006/relationships" xmlns:p="http://schemas.openxmlformats.org/presentationml/2006/main">
-  <p:cSld>
-    <p:spTree>
-      <p:nvGrpSpPr>
-        <p:cNvPr id="1" name=""/>
-        <p:cNvGrpSpPr/>
-        <p:nvPr/>
-      </p:nvGrpSpPr>
-      <p:grpSpPr>
-        <a:xfrm>
-          <a:off x="0" y="0"/>
-          <a:ext cx="0" cy="0"/>
-          <a:chOff x="0" y="0"/>
-          <a:chExt cx="0" cy="0"/>
-        </a:xfrm>
-      </p:grpSpPr>
-      <p:sp>
-        <p:nvSpPr>
-          <p:cNvPr id="2" name="Title 1"/>
-          <p:cNvSpPr>
-            <a:spLocks noGrp="1"/>
-          </p:cNvSpPr>
-          <p:nvPr>
-            <p:ph type="title"/>
-          </p:nvPr>
-        </p:nvSpPr>
-        <p:spPr/>
-        <p:txBody>
-          <a:bodyPr/>
-          <a:lstStyle/>
-          <a:p>
-            <a:r>
-              <a:rPr lang="en-US" dirty="0" smtClean="0"/>
-              <a:t>JDBC River Plugin. How and WHY?</a:t>
-            </a:r>
-            <a:endParaRPr lang="en-US" dirty="0"/>
-          </a:p>
-        </p:txBody>
-      </p:sp>
-      <p:pic>
-        <p:nvPicPr>
-          <p:cNvPr id="4" name="Content Placeholder 3" descr="Screen Shot 2014-05-12 at 11.09.32 AM.png"/>
-          <p:cNvPicPr>
-            <a:picLocks noGrp="1" noChangeAspect="1"/>
-          </p:cNvPicPr>
-          <p:nvPr>
-            <p:ph sz="quarter" idx="13"/>
-          </p:nvPr>
-        </p:nvPicPr>
-        <p:blipFill>
-          <a:blip r:embed="rId2">
-            <a:extLst>
-              <a:ext uri="{28A0092B-C50C-407E-A947-70E740481C1C}">
-                <a14:useLocalDpi xmlns:a14="http://schemas.microsoft.com/office/drawing/2010/main" val="0"/>
-              </a:ext>
-            </a:extLst>
-          </a:blip>
-          <a:srcRect l="-25235" r="-25235"/>
-          <a:stretch>
-            <a:fillRect/>
-          </a:stretch>
-        </p:blipFill>
-        <p:spPr/>
-      </p:pic>
-    </p:spTree>
-    <p:extLst>
-      <p:ext uri="{BB962C8B-B14F-4D97-AF65-F5344CB8AC3E}">
-        <p14:creationId xmlns:p14="http://schemas.microsoft.com/office/powerpoint/2010/main" val="1682887055"/>
-      </p:ext>
-    </p:extLst>
-  </p:cSld>
-  <p:clrMapOvr>
-    <a:masterClrMapping/>
-  </p:clrMapOvr>
-</p:sld>
-</file>
-
 <file path=ppt/slides/slide21.xml><?xml version="1.0" encoding="utf-8"?>
 <p:sld xmlns:a="http://schemas.openxmlformats.org/drawingml/2006/main" xmlns:r="http://schemas.openxmlformats.org/officeDocument/2006/relationships" xmlns:p="http://schemas.openxmlformats.org/presentationml/2006/main">
   <p:cSld>
@@ -4664,6 +4675,84 @@
           <a:p>
             <a:r>
               <a:rPr lang="en-US" dirty="0" smtClean="0"/>
+              <a:t>JDBC River Plugin. How and WHY?</a:t>
+            </a:r>
+            <a:endParaRPr lang="en-US" dirty="0"/>
+          </a:p>
+        </p:txBody>
+      </p:sp>
+      <p:pic>
+        <p:nvPicPr>
+          <p:cNvPr id="4" name="Content Placeholder 3" descr="Screen Shot 2014-05-12 at 11.09.32 AM.png"/>
+          <p:cNvPicPr>
+            <a:picLocks noGrp="1" noChangeAspect="1"/>
+          </p:cNvPicPr>
+          <p:nvPr>
+            <p:ph sz="quarter" idx="13"/>
+          </p:nvPr>
+        </p:nvPicPr>
+        <p:blipFill>
+          <a:blip r:embed="rId2">
+            <a:extLst>
+              <a:ext uri="{28A0092B-C50C-407E-A947-70E740481C1C}">
+                <a14:useLocalDpi xmlns:a14="http://schemas.microsoft.com/office/drawing/2010/main" val="0"/>
+              </a:ext>
+            </a:extLst>
+          </a:blip>
+          <a:srcRect l="-25235" r="-25235"/>
+          <a:stretch>
+            <a:fillRect/>
+          </a:stretch>
+        </p:blipFill>
+        <p:spPr/>
+      </p:pic>
+    </p:spTree>
+    <p:extLst>
+      <p:ext uri="{BB962C8B-B14F-4D97-AF65-F5344CB8AC3E}">
+        <p14:creationId xmlns:p14="http://schemas.microsoft.com/office/powerpoint/2010/main" val="1682887055"/>
+      </p:ext>
+    </p:extLst>
+  </p:cSld>
+  <p:clrMapOvr>
+    <a:masterClrMapping/>
+  </p:clrMapOvr>
+</p:sld>
+</file>
+
+<file path=ppt/slides/slide22.xml><?xml version="1.0" encoding="utf-8"?>
+<p:sld xmlns:a="http://schemas.openxmlformats.org/drawingml/2006/main" xmlns:r="http://schemas.openxmlformats.org/officeDocument/2006/relationships" xmlns:p="http://schemas.openxmlformats.org/presentationml/2006/main">
+  <p:cSld>
+    <p:spTree>
+      <p:nvGrpSpPr>
+        <p:cNvPr id="1" name=""/>
+        <p:cNvGrpSpPr/>
+        <p:nvPr/>
+      </p:nvGrpSpPr>
+      <p:grpSpPr>
+        <a:xfrm>
+          <a:off x="0" y="0"/>
+          <a:ext cx="0" cy="0"/>
+          <a:chOff x="0" y="0"/>
+          <a:chExt cx="0" cy="0"/>
+        </a:xfrm>
+      </p:grpSpPr>
+      <p:sp>
+        <p:nvSpPr>
+          <p:cNvPr id="2" name="Title 1"/>
+          <p:cNvSpPr>
+            <a:spLocks noGrp="1"/>
+          </p:cNvSpPr>
+          <p:nvPr>
+            <p:ph type="title"/>
+          </p:nvPr>
+        </p:nvSpPr>
+        <p:spPr/>
+        <p:txBody>
+          <a:bodyPr/>
+          <a:lstStyle/>
+          <a:p>
+            <a:r>
+              <a:rPr lang="en-US" dirty="0" smtClean="0"/>
               <a:t>JDBC River plugin. Architecture.</a:t>
             </a:r>
             <a:endParaRPr lang="en-US" dirty="0"/>
@@ -4708,7 +4797,7 @@
 </p:sld>
 </file>
 
-<file path=ppt/slides/slide22.xml><?xml version="1.0" encoding="utf-8"?>
+<file path=ppt/slides/slide23.xml><?xml version="1.0" encoding="utf-8"?>
 <p:sld xmlns:a="http://schemas.openxmlformats.org/drawingml/2006/main" xmlns:r="http://schemas.openxmlformats.org/officeDocument/2006/relationships" xmlns:p="http://schemas.openxmlformats.org/presentationml/2006/main">
   <p:cSld>
     <p:spTree>
@@ -4947,88 +5036,6 @@
 </p:sld>
 </file>
 
-<file path=ppt/slides/slide23.xml><?xml version="1.0" encoding="utf-8"?>
-<p:sld xmlns:a="http://schemas.openxmlformats.org/drawingml/2006/main" xmlns:r="http://schemas.openxmlformats.org/officeDocument/2006/relationships" xmlns:p="http://schemas.openxmlformats.org/presentationml/2006/main">
-  <p:cSld>
-    <p:spTree>
-      <p:nvGrpSpPr>
-        <p:cNvPr id="1" name=""/>
-        <p:cNvGrpSpPr/>
-        <p:nvPr/>
-      </p:nvGrpSpPr>
-      <p:grpSpPr>
-        <a:xfrm>
-          <a:off x="0" y="0"/>
-          <a:ext cx="0" cy="0"/>
-          <a:chOff x="0" y="0"/>
-          <a:chExt cx="0" cy="0"/>
-        </a:xfrm>
-      </p:grpSpPr>
-      <p:sp>
-        <p:nvSpPr>
-          <p:cNvPr id="2" name="Title 1"/>
-          <p:cNvSpPr>
-            <a:spLocks noGrp="1"/>
-          </p:cNvSpPr>
-          <p:nvPr>
-            <p:ph type="title"/>
-          </p:nvPr>
-        </p:nvSpPr>
-        <p:spPr/>
-        <p:txBody>
-          <a:bodyPr/>
-          <a:lstStyle/>
-          <a:p>
-            <a:r>
-              <a:rPr lang="en-US" dirty="0" err="1" smtClean="0"/>
-              <a:t>Kibana</a:t>
-            </a:r>
-            <a:r>
-              <a:rPr lang="en-US" dirty="0" smtClean="0"/>
-              <a:t> Data view</a:t>
-            </a:r>
-            <a:endParaRPr lang="en-US" dirty="0"/>
-          </a:p>
-        </p:txBody>
-      </p:sp>
-      <p:pic>
-        <p:nvPicPr>
-          <p:cNvPr id="4" name="Content Placeholder 3" descr="Screen Shot 2014-05-12 at 7.57.58 PM.png"/>
-          <p:cNvPicPr>
-            <a:picLocks noGrp="1" noChangeAspect="1"/>
-          </p:cNvPicPr>
-          <p:nvPr>
-            <p:ph sz="quarter" idx="13"/>
-          </p:nvPr>
-        </p:nvPicPr>
-        <p:blipFill>
-          <a:blip r:embed="rId2">
-            <a:extLst>
-              <a:ext uri="{28A0092B-C50C-407E-A947-70E740481C1C}">
-                <a14:useLocalDpi xmlns:a14="http://schemas.microsoft.com/office/drawing/2010/main" val="0"/>
-              </a:ext>
-            </a:extLst>
-          </a:blip>
-          <a:srcRect l="-10626" r="-10626"/>
-          <a:stretch>
-            <a:fillRect/>
-          </a:stretch>
-        </p:blipFill>
-        <p:spPr/>
-      </p:pic>
-    </p:spTree>
-    <p:extLst>
-      <p:ext uri="{BB962C8B-B14F-4D97-AF65-F5344CB8AC3E}">
-        <p14:creationId xmlns:p14="http://schemas.microsoft.com/office/powerpoint/2010/main" val="1756834039"/>
-      </p:ext>
-    </p:extLst>
-  </p:cSld>
-  <p:clrMapOvr>
-    <a:masterClrMapping/>
-  </p:clrMapOvr>
-</p:sld>
-</file>
-
 <file path=ppt/slides/slide24.xml><?xml version="1.0" encoding="utf-8"?>
 <p:sld xmlns:a="http://schemas.openxmlformats.org/drawingml/2006/main" xmlns:r="http://schemas.openxmlformats.org/officeDocument/2006/relationships" xmlns:p="http://schemas.openxmlformats.org/presentationml/2006/main">
   <p:cSld>
@@ -5062,8 +5069,12 @@
           <a:lstStyle/>
           <a:p>
             <a:r>
-              <a:rPr lang="en-US" dirty="0" smtClean="0"/>
-              <a:t>Reels View</a:t>
+              <a:rPr lang="en-US" dirty="0" err="1" smtClean="0"/>
+              <a:t>Kibana</a:t>
+            </a:r>
+            <a:r>
+              <a:rPr lang="en-US" dirty="0" smtClean="0"/>
+              <a:t> Data view</a:t>
             </a:r>
             <a:endParaRPr lang="en-US" dirty="0"/>
           </a:p>
@@ -5071,7 +5082,7 @@
       </p:sp>
       <p:pic>
         <p:nvPicPr>
-          <p:cNvPr id="4" name="Content Placeholder 3" descr="Screen Shot 2014-05-12 at 7.58.26 PM.png"/>
+          <p:cNvPr id="4" name="Content Placeholder 3" descr="Screen Shot 2014-05-12 at 7.57.58 PM.png"/>
           <p:cNvPicPr>
             <a:picLocks noGrp="1" noChangeAspect="1"/>
           </p:cNvPicPr>
@@ -5087,7 +5098,7 @@
               </a:ext>
             </a:extLst>
           </a:blip>
-          <a:srcRect l="-1685" r="-1685"/>
+          <a:srcRect l="-10626" r="-10626"/>
           <a:stretch>
             <a:fillRect/>
           </a:stretch>
@@ -5097,7 +5108,7 @@
     </p:spTree>
     <p:extLst>
       <p:ext uri="{BB962C8B-B14F-4D97-AF65-F5344CB8AC3E}">
-        <p14:creationId xmlns:p14="http://schemas.microsoft.com/office/powerpoint/2010/main" val="3016900089"/>
+        <p14:creationId xmlns:p14="http://schemas.microsoft.com/office/powerpoint/2010/main" val="1756834039"/>
       </p:ext>
     </p:extLst>
   </p:cSld>
@@ -5141,7 +5152,7 @@
           <a:p>
             <a:r>
               <a:rPr lang="en-US" dirty="0" smtClean="0"/>
-              <a:t>Quick check on symbols.</a:t>
+              <a:t>Reels View</a:t>
             </a:r>
             <a:endParaRPr lang="en-US" dirty="0"/>
           </a:p>
@@ -5149,7 +5160,7 @@
       </p:sp>
       <p:pic>
         <p:nvPicPr>
-          <p:cNvPr id="4" name="Content Placeholder 3" descr="Screen Shot 2014-05-13 at 3.31.46 PM.png"/>
+          <p:cNvPr id="4" name="Content Placeholder 3" descr="Screen Shot 2014-05-12 at 7.58.26 PM.png"/>
           <p:cNvPicPr>
             <a:picLocks noGrp="1" noChangeAspect="1"/>
           </p:cNvPicPr>
@@ -5165,7 +5176,7 @@
               </a:ext>
             </a:extLst>
           </a:blip>
-          <a:srcRect t="-1881" b="-1881"/>
+          <a:srcRect l="-1685" r="-1685"/>
           <a:stretch>
             <a:fillRect/>
           </a:stretch>
@@ -5175,7 +5186,7 @@
     </p:spTree>
     <p:extLst>
       <p:ext uri="{BB962C8B-B14F-4D97-AF65-F5344CB8AC3E}">
-        <p14:creationId xmlns:p14="http://schemas.microsoft.com/office/powerpoint/2010/main" val="3272432676"/>
+        <p14:creationId xmlns:p14="http://schemas.microsoft.com/office/powerpoint/2010/main" val="3016900089"/>
       </p:ext>
     </p:extLst>
   </p:cSld>
@@ -5219,7 +5230,7 @@
           <a:p>
             <a:r>
               <a:rPr lang="en-US" dirty="0" smtClean="0"/>
-              <a:t>Quick RTP</a:t>
+              <a:t>Quick check on symbols.</a:t>
             </a:r>
             <a:endParaRPr lang="en-US" dirty="0"/>
           </a:p>
@@ -5227,7 +5238,7 @@
       </p:sp>
       <p:pic>
         <p:nvPicPr>
-          <p:cNvPr id="4" name="Content Placeholder 3" descr="Screen Shot 2014-05-13 at 4.10.41 PM.png"/>
+          <p:cNvPr id="4" name="Content Placeholder 3" descr="Screen Shot 2014-05-13 at 3.31.46 PM.png"/>
           <p:cNvPicPr>
             <a:picLocks noGrp="1" noChangeAspect="1"/>
           </p:cNvPicPr>
@@ -5243,7 +5254,7 @@
               </a:ext>
             </a:extLst>
           </a:blip>
-          <a:srcRect l="-64118" r="-64118"/>
+          <a:srcRect t="-1881" b="-1881"/>
           <a:stretch>
             <a:fillRect/>
           </a:stretch>
@@ -5253,7 +5264,7 @@
     </p:spTree>
     <p:extLst>
       <p:ext uri="{BB962C8B-B14F-4D97-AF65-F5344CB8AC3E}">
-        <p14:creationId xmlns:p14="http://schemas.microsoft.com/office/powerpoint/2010/main" val="2598528484"/>
+        <p14:creationId xmlns:p14="http://schemas.microsoft.com/office/powerpoint/2010/main" val="3272432676"/>
       </p:ext>
     </p:extLst>
   </p:cSld>
@@ -5297,7 +5308,7 @@
           <a:p>
             <a:r>
               <a:rPr lang="en-US" dirty="0" smtClean="0"/>
-              <a:t>Symbols Distribution over Time</a:t>
+              <a:t>Quick RTP</a:t>
             </a:r>
             <a:endParaRPr lang="en-US" dirty="0"/>
           </a:p>
@@ -5305,7 +5316,7 @@
       </p:sp>
       <p:pic>
         <p:nvPicPr>
-          <p:cNvPr id="4" name="Content Placeholder 3" descr="Screen Shot 2014-05-13 at 4.12.23 PM.png"/>
+          <p:cNvPr id="4" name="Content Placeholder 3" descr="Screen Shot 2014-05-13 at 4.10.41 PM.png"/>
           <p:cNvPicPr>
             <a:picLocks noGrp="1" noChangeAspect="1"/>
           </p:cNvPicPr>
@@ -5321,7 +5332,7 @@
               </a:ext>
             </a:extLst>
           </a:blip>
-          <a:srcRect t="-6285" b="-6285"/>
+          <a:srcRect l="-64118" r="-64118"/>
           <a:stretch>
             <a:fillRect/>
           </a:stretch>
@@ -5331,7 +5342,7 @@
     </p:spTree>
     <p:extLst>
       <p:ext uri="{BB962C8B-B14F-4D97-AF65-F5344CB8AC3E}">
-        <p14:creationId xmlns:p14="http://schemas.microsoft.com/office/powerpoint/2010/main" val="2202675871"/>
+        <p14:creationId xmlns:p14="http://schemas.microsoft.com/office/powerpoint/2010/main" val="2598528484"/>
       </p:ext>
     </p:extLst>
   </p:cSld>
@@ -5375,15 +5386,7 @@
           <a:p>
             <a:r>
               <a:rPr lang="en-US" dirty="0" smtClean="0"/>
-              <a:t>Sense. Chrome Plugin for </a:t>
-            </a:r>
-            <a:r>
-              <a:rPr lang="en-US" dirty="0" err="1" smtClean="0"/>
-              <a:t>json</a:t>
-            </a:r>
-            <a:r>
-              <a:rPr lang="en-US" dirty="0" smtClean="0"/>
-              <a:t>.</a:t>
+              <a:t>Symbols Distribution over Time</a:t>
             </a:r>
             <a:endParaRPr lang="en-US" dirty="0"/>
           </a:p>
@@ -5391,7 +5394,7 @@
       </p:sp>
       <p:pic>
         <p:nvPicPr>
-          <p:cNvPr id="4" name="Content Placeholder 3" descr="Screen Shot 2014-05-13 at 10.38.54 AM.png"/>
+          <p:cNvPr id="4" name="Content Placeholder 3" descr="Screen Shot 2014-05-13 at 4.12.23 PM.png"/>
           <p:cNvPicPr>
             <a:picLocks noGrp="1" noChangeAspect="1"/>
           </p:cNvPicPr>
@@ -5407,7 +5410,7 @@
               </a:ext>
             </a:extLst>
           </a:blip>
-          <a:srcRect l="-41770" r="-41770"/>
+          <a:srcRect t="-6285" b="-6285"/>
           <a:stretch>
             <a:fillRect/>
           </a:stretch>
@@ -5417,7 +5420,7 @@
     </p:spTree>
     <p:extLst>
       <p:ext uri="{BB962C8B-B14F-4D97-AF65-F5344CB8AC3E}">
-        <p14:creationId xmlns:p14="http://schemas.microsoft.com/office/powerpoint/2010/main" val="2825510861"/>
+        <p14:creationId xmlns:p14="http://schemas.microsoft.com/office/powerpoint/2010/main" val="2202675871"/>
       </p:ext>
     </p:extLst>
   </p:cSld>
@@ -5460,50 +5463,50 @@
           <a:lstStyle/>
           <a:p>
             <a:r>
+              <a:rPr lang="en-US" dirty="0" smtClean="0"/>
+              <a:t>Sense. Chrome Plugin for </a:t>
+            </a:r>
+            <a:r>
               <a:rPr lang="en-US" dirty="0" err="1" smtClean="0"/>
-              <a:t>Elasticsearch</a:t>
-            </a:r>
-            <a:r>
-              <a:rPr lang="en-US" dirty="0" smtClean="0"/>
-              <a:t> alternatives?</a:t>
+              <a:t>json</a:t>
+            </a:r>
+            <a:r>
+              <a:rPr lang="en-US" dirty="0" smtClean="0"/>
+              <a:t>.</a:t>
             </a:r>
             <a:endParaRPr lang="en-US" dirty="0"/>
           </a:p>
         </p:txBody>
       </p:sp>
-      <p:sp>
-        <p:nvSpPr>
-          <p:cNvPr id="3" name="Content Placeholder 2"/>
-          <p:cNvSpPr>
-            <a:spLocks noGrp="1"/>
-          </p:cNvSpPr>
+      <p:pic>
+        <p:nvPicPr>
+          <p:cNvPr id="4" name="Content Placeholder 3" descr="Screen Shot 2014-05-13 at 10.38.54 AM.png"/>
+          <p:cNvPicPr>
+            <a:picLocks noGrp="1" noChangeAspect="1"/>
+          </p:cNvPicPr>
           <p:nvPr>
             <p:ph sz="quarter" idx="13"/>
           </p:nvPr>
-        </p:nvSpPr>
-        <p:spPr/>
-        <p:txBody>
-          <a:bodyPr/>
-          <a:lstStyle/>
-          <a:p>
-            <a:r>
-              <a:rPr lang="en-US" dirty="0" err="1" smtClean="0"/>
-              <a:t>Solr</a:t>
-            </a:r>
-            <a:endParaRPr lang="en-US" dirty="0" smtClean="0"/>
-          </a:p>
-          <a:p>
-            <a:pPr marL="0" indent="0">
-              <a:buNone/>
-            </a:pPr>
-            <a:endParaRPr lang="en-US" dirty="0"/>
-          </a:p>
-        </p:txBody>
-      </p:sp>
+        </p:nvPicPr>
+        <p:blipFill>
+          <a:blip r:embed="rId2">
+            <a:extLst>
+              <a:ext uri="{28A0092B-C50C-407E-A947-70E740481C1C}">
+                <a14:useLocalDpi xmlns:a14="http://schemas.microsoft.com/office/drawing/2010/main" val="0"/>
+              </a:ext>
+            </a:extLst>
+          </a:blip>
+          <a:srcRect l="-41770" r="-41770"/>
+          <a:stretch>
+            <a:fillRect/>
+          </a:stretch>
+        </p:blipFill>
+        <p:spPr/>
+      </p:pic>
     </p:spTree>
     <p:extLst>
       <p:ext uri="{BB962C8B-B14F-4D97-AF65-F5344CB8AC3E}">
-        <p14:creationId xmlns:p14="http://schemas.microsoft.com/office/powerpoint/2010/main" val="3165192188"/>
+        <p14:creationId xmlns:p14="http://schemas.microsoft.com/office/powerpoint/2010/main" val="2825510861"/>
       </p:ext>
     </p:extLst>
   </p:cSld>
@@ -5578,8 +5581,13 @@
           <a:p>
             <a:r>
               <a:rPr lang="en-US" dirty="0" smtClean="0"/>
-              <a:t>Java-based indexing and search technology</a:t>
-            </a:r>
+              <a:t>Java-based indexing and search </a:t>
+            </a:r>
+            <a:r>
+              <a:rPr lang="en-US" dirty="0" smtClean="0"/>
+              <a:t>technology.</a:t>
+            </a:r>
+            <a:endParaRPr lang="en-US" dirty="0" smtClean="0"/>
           </a:p>
           <a:p>
             <a:r>
@@ -5598,6 +5606,26 @@
               <a:rPr lang="en-US" dirty="0" smtClean="0"/>
               <a:t> Core, with XML/HTTP and JSON/Python/Ruby APIs, hit highlighting, facets search, caching, replication, and a web admin interface.  </a:t>
             </a:r>
+            <a:endParaRPr lang="en-US" dirty="0" smtClean="0"/>
+          </a:p>
+          <a:p>
+            <a:r>
+              <a:rPr lang="en-US" dirty="0" err="1" smtClean="0"/>
+              <a:t>Lucene</a:t>
+            </a:r>
+            <a:r>
+              <a:rPr lang="en-US" dirty="0" smtClean="0"/>
+              <a:t>. Open Source APIs design </a:t>
+            </a:r>
+            <a:r>
+              <a:rPr lang="en-US" dirty="0" smtClean="0"/>
+              <a:t>to </a:t>
+            </a:r>
+            <a:r>
+              <a:rPr lang="en-US" dirty="0" smtClean="0"/>
+              <a:t>search. </a:t>
+            </a:r>
+            <a:endParaRPr lang="en-US" dirty="0" smtClean="0"/>
           </a:p>
           <a:p>
             <a:endParaRPr lang="en-US" dirty="0"/>
@@ -5650,8 +5678,12 @@
           <a:lstStyle/>
           <a:p>
             <a:r>
-              <a:rPr lang="en-US" dirty="0" smtClean="0"/>
-              <a:t>setup</a:t>
+              <a:rPr lang="en-US" dirty="0" err="1" smtClean="0"/>
+              <a:t>Elasticsearch</a:t>
+            </a:r>
+            <a:r>
+              <a:rPr lang="en-US" dirty="0" smtClean="0"/>
+              <a:t> alternatives?</a:t>
             </a:r>
             <a:endParaRPr lang="en-US" dirty="0"/>
           </a:p>
@@ -5674,53 +5706,14 @@
           <a:p>
             <a:r>
               <a:rPr lang="en-US" dirty="0" err="1" smtClean="0"/>
-              <a:t>wget</a:t>
-            </a:r>
-            <a:r>
-              <a:rPr lang="en-US" dirty="0" smtClean="0"/>
-              <a:t> </a:t>
-            </a:r>
-            <a:r>
-              <a:rPr lang="en-US" dirty="0" err="1" smtClean="0"/>
-              <a:t>elasticsearch.tar.gz</a:t>
+              <a:t>Solr</a:t>
             </a:r>
             <a:endParaRPr lang="en-US" dirty="0" smtClean="0"/>
           </a:p>
           <a:p>
-            <a:r>
-              <a:rPr lang="en-US" dirty="0" smtClean="0"/>
-              <a:t>tar </a:t>
-            </a:r>
-            <a:r>
-              <a:rPr lang="en-US" dirty="0" err="1" smtClean="0"/>
-              <a:t>xzvf</a:t>
-            </a:r>
-            <a:r>
-              <a:rPr lang="en-US" dirty="0" smtClean="0"/>
-              <a:t>   </a:t>
-            </a:r>
-            <a:r>
-              <a:rPr lang="en-US" dirty="0" err="1"/>
-              <a:t>elasticsearch.tar.gz</a:t>
-            </a:r>
-            <a:endParaRPr lang="en-US" dirty="0"/>
-          </a:p>
-          <a:p>
-            <a:r>
-              <a:rPr lang="en-US" dirty="0" smtClean="0"/>
-              <a:t>bin/</a:t>
-            </a:r>
-            <a:r>
-              <a:rPr lang="en-US" dirty="0" err="1" smtClean="0"/>
-              <a:t>elasticsearch</a:t>
-            </a:r>
-            <a:endParaRPr lang="en-US" dirty="0" smtClean="0"/>
-          </a:p>
-          <a:p>
-            <a:r>
-              <a:rPr lang="en-US" dirty="0" smtClean="0"/>
-              <a:t>curl localhost:9200</a:t>
-            </a:r>
+            <a:pPr marL="0" indent="0">
+              <a:buNone/>
+            </a:pPr>
             <a:endParaRPr lang="en-US" dirty="0"/>
           </a:p>
         </p:txBody>
@@ -5728,7 +5721,7 @@
     </p:spTree>
     <p:extLst>
       <p:ext uri="{BB962C8B-B14F-4D97-AF65-F5344CB8AC3E}">
-        <p14:creationId xmlns:p14="http://schemas.microsoft.com/office/powerpoint/2010/main" val="4074957073"/>
+        <p14:creationId xmlns:p14="http://schemas.microsoft.com/office/powerpoint/2010/main" val="3165192188"/>
       </p:ext>
     </p:extLst>
   </p:cSld>
@@ -5772,7 +5765,7 @@
           <a:p>
             <a:r>
               <a:rPr lang="en-US" dirty="0" smtClean="0"/>
-              <a:t>the data in. Documents in.</a:t>
+              <a:t>setup</a:t>
             </a:r>
             <a:endParaRPr lang="en-US" dirty="0"/>
           </a:p>
@@ -5794,61 +5787,53 @@
           <a:lstStyle/>
           <a:p>
             <a:r>
-              <a:rPr lang="en-US" dirty="0" smtClean="0"/>
-              <a:t>curl –XPUT localhost:9200/game/name/</a:t>
-            </a:r>
-            <a:r>
               <a:rPr lang="en-US" dirty="0" err="1" smtClean="0"/>
-              <a:t>lucky_words</a:t>
-            </a:r>
-            <a:r>
-              <a:rPr lang="en-US" dirty="0" smtClean="0"/>
-              <a:t> –d `{“some” : </a:t>
+              <a:t>wget</a:t>
+            </a:r>
+            <a:r>
+              <a:rPr lang="en-US" dirty="0" smtClean="0"/>
+              <a:t> </a:t>
             </a:r>
             <a:r>
               <a:rPr lang="en-US" dirty="0" err="1" smtClean="0"/>
-              <a:t>json</a:t>
-            </a:r>
-            <a:r>
-              <a:rPr lang="en-US" dirty="0" smtClean="0"/>
-              <a:t> }`</a:t>
-            </a:r>
-          </a:p>
-          <a:p>
-            <a:r>
-              <a:rPr lang="en-US" dirty="0"/>
-              <a:t>curl –</a:t>
-            </a:r>
-            <a:r>
-              <a:rPr lang="en-US" dirty="0" smtClean="0"/>
-              <a:t>XGET </a:t>
-            </a:r>
-            <a:r>
-              <a:rPr lang="en-US" dirty="0"/>
-              <a:t>localhost:9200/game/name/</a:t>
+              <a:t>elasticsearch.tar.gz</a:t>
+            </a:r>
+            <a:endParaRPr lang="en-US" dirty="0" smtClean="0"/>
+          </a:p>
+          <a:p>
+            <a:r>
+              <a:rPr lang="en-US" dirty="0" smtClean="0"/>
+              <a:t>tar </a:t>
             </a:r>
             <a:r>
               <a:rPr lang="en-US" dirty="0" err="1" smtClean="0"/>
-              <a:t>lucky_words</a:t>
+              <a:t>xzvf</a:t>
+            </a:r>
+            <a:r>
+              <a:rPr lang="en-US" dirty="0" smtClean="0"/>
+              <a:t>   </a:t>
+            </a:r>
+            <a:r>
+              <a:rPr lang="en-US" dirty="0" err="1"/>
+              <a:t>elasticsearch.tar.gz</a:t>
+            </a:r>
+            <a:endParaRPr lang="en-US" dirty="0"/>
+          </a:p>
+          <a:p>
+            <a:r>
+              <a:rPr lang="en-US" dirty="0" smtClean="0"/>
+              <a:t>bin/</a:t>
+            </a:r>
+            <a:r>
+              <a:rPr lang="en-US" dirty="0" err="1" smtClean="0"/>
+              <a:t>elasticsearch</a:t>
             </a:r>
             <a:endParaRPr lang="en-US" dirty="0" smtClean="0"/>
           </a:p>
           <a:p>
             <a:r>
-              <a:rPr lang="en-US" dirty="0"/>
-              <a:t>curl –</a:t>
-            </a:r>
-            <a:r>
-              <a:rPr lang="en-US" dirty="0" smtClean="0"/>
-              <a:t>XDELETE </a:t>
-            </a:r>
-            <a:r>
-              <a:rPr lang="en-US" dirty="0"/>
-              <a:t>localhost:9200/game/name/</a:t>
-            </a:r>
-            <a:r>
-              <a:rPr lang="en-US" dirty="0" err="1"/>
-              <a:t>lucky_words</a:t>
+              <a:rPr lang="en-US" dirty="0" smtClean="0"/>
+              <a:t>curl localhost:9200</a:t>
             </a:r>
             <a:endParaRPr lang="en-US" dirty="0"/>
           </a:p>
@@ -5857,7 +5842,7 @@
     </p:spTree>
     <p:extLst>
       <p:ext uri="{BB962C8B-B14F-4D97-AF65-F5344CB8AC3E}">
-        <p14:creationId xmlns:p14="http://schemas.microsoft.com/office/powerpoint/2010/main" val="1232051042"/>
+        <p14:creationId xmlns:p14="http://schemas.microsoft.com/office/powerpoint/2010/main" val="4074957073"/>
       </p:ext>
     </p:extLst>
   </p:cSld>
@@ -5901,7 +5886,7 @@
           <a:p>
             <a:r>
               <a:rPr lang="en-US" dirty="0" smtClean="0"/>
-              <a:t>Search</a:t>
+              <a:t>the data in. Documents in.</a:t>
             </a:r>
             <a:endParaRPr lang="en-US" dirty="0"/>
           </a:p>
@@ -5921,6 +5906,28 @@
         <p:txBody>
           <a:bodyPr/>
           <a:lstStyle/>
+          <a:p>
+            <a:r>
+              <a:rPr lang="en-US" dirty="0" smtClean="0"/>
+              <a:t>curl –XPUT localhost:9200/game/name/</a:t>
+            </a:r>
+            <a:r>
+              <a:rPr lang="en-US" dirty="0" err="1" smtClean="0"/>
+              <a:t>lucky_words</a:t>
+            </a:r>
+            <a:r>
+              <a:rPr lang="en-US" dirty="0" smtClean="0"/>
+              <a:t> –d `{“some” : </a:t>
+            </a:r>
+            <a:r>
+              <a:rPr lang="en-US" dirty="0" err="1" smtClean="0"/>
+              <a:t>json</a:t>
+            </a:r>
+            <a:r>
+              <a:rPr lang="en-US" dirty="0" smtClean="0"/>
+              <a:t> }`</a:t>
+            </a:r>
+          </a:p>
           <a:p>
             <a:r>
               <a:rPr lang="en-US" dirty="0"/>
@@ -5932,127 +5939,31 @@
             </a:r>
             <a:r>
               <a:rPr lang="en-US" dirty="0"/>
-              <a:t>localhost:9200</a:t>
-            </a:r>
-            <a:r>
-              <a:rPr lang="en-US" dirty="0" smtClean="0"/>
-              <a:t>/_</a:t>
-            </a:r>
-            <a:r>
-              <a:rPr lang="en-US" dirty="0" err="1" smtClean="0"/>
-              <a:t>search?q</a:t>
-            </a:r>
-            <a:r>
-              <a:rPr lang="en-US" dirty="0" smtClean="0"/>
-              <a:t>=</a:t>
-            </a:r>
-            <a:r>
-              <a:rPr lang="en-US" dirty="0" err="1" smtClean="0"/>
-              <a:t>best_game</a:t>
-            </a:r>
-            <a:endParaRPr lang="en-US" dirty="0" smtClean="0"/>
-          </a:p>
-          <a:p>
-            <a:endParaRPr lang="en-US" dirty="0" smtClean="0"/>
-          </a:p>
-          <a:p>
-            <a:r>
-              <a:rPr lang="en-US" dirty="0"/>
-              <a:t>curl –XGET localhost:9200/</a:t>
-            </a:r>
-            <a:r>
-              <a:rPr lang="en-US" dirty="0" smtClean="0"/>
-              <a:t>_search –d `{</a:t>
-            </a:r>
-          </a:p>
-          <a:p>
-            <a:pPr marL="457200" lvl="1" indent="0">
-              <a:buNone/>
-            </a:pPr>
-            <a:r>
-              <a:rPr lang="en-US" dirty="0"/>
-              <a:t> </a:t>
-            </a:r>
-            <a:r>
-              <a:rPr lang="en-US" dirty="0" smtClean="0"/>
-              <a:t>“query”:  {</a:t>
-            </a:r>
-          </a:p>
-          <a:p>
-            <a:pPr marL="457200" lvl="1" indent="0">
-              <a:buNone/>
-            </a:pPr>
-            <a:r>
-              <a:rPr lang="en-US" dirty="0"/>
-              <a:t>	</a:t>
-            </a:r>
-            <a:r>
-              <a:rPr lang="en-US" dirty="0" smtClean="0"/>
-              <a:t>“</a:t>
-            </a:r>
-            <a:r>
-              <a:rPr lang="en-US" dirty="0" err="1" smtClean="0"/>
-              <a:t>query_string</a:t>
-            </a:r>
-            <a:r>
-              <a:rPr lang="en-US" dirty="0" smtClean="0"/>
-              <a:t>”: {</a:t>
-            </a:r>
-          </a:p>
-          <a:p>
-            <a:pPr marL="457200" lvl="1" indent="0">
-              <a:buNone/>
-            </a:pPr>
-            <a:r>
-              <a:rPr lang="en-US" dirty="0"/>
-              <a:t>	</a:t>
-            </a:r>
-            <a:r>
-              <a:rPr lang="en-US" dirty="0" smtClean="0"/>
-              <a:t>	“query”: “</a:t>
+              <a:t>localhost:9200/game/name/</a:t>
             </a:r>
             <a:r>
               <a:rPr lang="en-US" dirty="0" err="1" smtClean="0"/>
               <a:t>lucky_words</a:t>
             </a:r>
-            <a:r>
-              <a:rPr lang="en-US" dirty="0" smtClean="0"/>
-              <a:t> AND rtp:95”</a:t>
-            </a:r>
-          </a:p>
-          <a:p>
-            <a:pPr marL="457200" lvl="1" indent="0">
-              <a:buNone/>
-            </a:pPr>
+            <a:endParaRPr lang="en-US" dirty="0" smtClean="0"/>
+          </a:p>
+          <a:p>
             <a:r>
               <a:rPr lang="en-US" dirty="0"/>
-              <a:t>	</a:t>
-            </a:r>
-            <a:r>
-              <a:rPr lang="en-US" dirty="0" smtClean="0"/>
-              <a:t>	}</a:t>
-            </a:r>
-          </a:p>
-          <a:p>
-            <a:pPr marL="457200" lvl="1" indent="0">
-              <a:buNone/>
-            </a:pPr>
-            <a:r>
-              <a:rPr lang="en-US" dirty="0" smtClean="0"/>
-              <a:t>	}</a:t>
-            </a:r>
-          </a:p>
-          <a:p>
-            <a:pPr marL="457200" lvl="1" indent="0">
-              <a:buNone/>
-            </a:pPr>
-            <a:r>
-              <a:rPr lang="en-US" dirty="0" smtClean="0"/>
-              <a:t>}`</a:t>
-            </a:r>
-            <a:endParaRPr lang="en-US" dirty="0"/>
-          </a:p>
-          <a:p>
+              <a:t>curl –</a:t>
+            </a:r>
+            <a:r>
+              <a:rPr lang="en-US" dirty="0" smtClean="0"/>
+              <a:t>XDELETE </a:t>
+            </a:r>
+            <a:r>
+              <a:rPr lang="en-US" dirty="0"/>
+              <a:t>localhost:9200/game/name/</a:t>
+            </a:r>
+            <a:r>
+              <a:rPr lang="en-US" dirty="0" err="1"/>
+              <a:t>lucky_words</a:t>
+            </a:r>
             <a:endParaRPr lang="en-US" dirty="0"/>
           </a:p>
         </p:txBody>
@@ -6060,7 +5971,7 @@
     </p:spTree>
     <p:extLst>
       <p:ext uri="{BB962C8B-B14F-4D97-AF65-F5344CB8AC3E}">
-        <p14:creationId xmlns:p14="http://schemas.microsoft.com/office/powerpoint/2010/main" val="1726973554"/>
+        <p14:creationId xmlns:p14="http://schemas.microsoft.com/office/powerpoint/2010/main" val="1232051042"/>
       </p:ext>
     </p:extLst>
   </p:cSld>
@@ -6104,7 +6015,7 @@
           <a:p>
             <a:r>
               <a:rPr lang="en-US" dirty="0" smtClean="0"/>
-              <a:t>Query your data</a:t>
+              <a:t>Search</a:t>
             </a:r>
             <a:endParaRPr lang="en-US" dirty="0"/>
           </a:p>
@@ -6126,29 +6037,136 @@
           <a:lstStyle/>
           <a:p>
             <a:r>
-              <a:rPr lang="en-US" dirty="0" smtClean="0"/>
-              <a:t>Query format – JSON</a:t>
-            </a:r>
-          </a:p>
-          <a:p>
-            <a:r>
-              <a:rPr lang="en-US" dirty="0" smtClean="0"/>
-              <a:t>Build in filters</a:t>
-            </a:r>
-          </a:p>
-          <a:p>
-            <a:r>
-              <a:rPr lang="en-US" dirty="0" smtClean="0"/>
-              <a:t>Queries </a:t>
+              <a:rPr lang="en-US" dirty="0"/>
+              <a:t>curl –</a:t>
+            </a:r>
+            <a:r>
+              <a:rPr lang="en-US" dirty="0" smtClean="0"/>
+              <a:t>XGET </a:t>
+            </a:r>
+            <a:r>
+              <a:rPr lang="en-US" dirty="0"/>
+              <a:t>localhost:9200</a:t>
+            </a:r>
+            <a:r>
+              <a:rPr lang="en-US" dirty="0" smtClean="0"/>
+              <a:t>/_</a:t>
             </a:r>
             <a:r>
               <a:rPr lang="en-US" dirty="0" err="1" smtClean="0"/>
-              <a:t>vs</a:t>
-            </a:r>
-            <a:r>
-              <a:rPr lang="en-US" dirty="0" smtClean="0"/>
-              <a:t> Filters</a:t>
-            </a:r>
+              <a:t>search?q</a:t>
+            </a:r>
+            <a:r>
+              <a:rPr lang="en-US" dirty="0" smtClean="0"/>
+              <a:t>=</a:t>
+            </a:r>
+            <a:r>
+              <a:rPr lang="en-US" dirty="0" err="1" smtClean="0"/>
+              <a:t>best_game</a:t>
+            </a:r>
+            <a:endParaRPr lang="en-US" dirty="0" smtClean="0"/>
+          </a:p>
+          <a:p>
+            <a:endParaRPr lang="en-US" dirty="0" smtClean="0"/>
+          </a:p>
+          <a:p>
+            <a:r>
+              <a:rPr lang="en-US" dirty="0"/>
+              <a:t>curl –XGET localhost:9200/</a:t>
+            </a:r>
+            <a:r>
+              <a:rPr lang="en-US" dirty="0" smtClean="0"/>
+              <a:t>_search –d `{</a:t>
+            </a:r>
+          </a:p>
+          <a:p>
+            <a:pPr marL="457200" lvl="1" indent="0">
+              <a:buNone/>
+            </a:pPr>
+            <a:r>
+              <a:rPr lang="en-US" dirty="0"/>
+              <a:t> </a:t>
+            </a:r>
+            <a:r>
+              <a:rPr lang="en-US" dirty="0" smtClean="0"/>
+              <a:t>“query”:  {</a:t>
+            </a:r>
+          </a:p>
+          <a:p>
+            <a:pPr marL="457200" lvl="1" indent="0">
+              <a:buNone/>
+            </a:pPr>
+            <a:r>
+              <a:rPr lang="en-US" dirty="0"/>
+              <a:t>	</a:t>
+            </a:r>
+            <a:r>
+              <a:rPr lang="en-US" dirty="0" smtClean="0"/>
+              <a:t>“</a:t>
+            </a:r>
+            <a:r>
+              <a:rPr lang="en-US" dirty="0" err="1" smtClean="0"/>
+              <a:t>query_string</a:t>
+            </a:r>
+            <a:r>
+              <a:rPr lang="en-US" dirty="0" smtClean="0"/>
+              <a:t>”: {</a:t>
+            </a:r>
+          </a:p>
+          <a:p>
+            <a:pPr marL="457200" lvl="1" indent="0">
+              <a:buNone/>
+            </a:pPr>
+            <a:r>
+              <a:rPr lang="en-US" dirty="0"/>
+              <a:t>	</a:t>
+            </a:r>
+            <a:r>
+              <a:rPr lang="en-US" dirty="0" smtClean="0"/>
+              <a:t>	“query”: “</a:t>
+            </a:r>
+            <a:r>
+              <a:rPr lang="en-US" dirty="0" err="1" smtClean="0"/>
+              <a:t>lucky_words</a:t>
+            </a:r>
+            <a:r>
+              <a:rPr lang="en-US" dirty="0" smtClean="0"/>
+              <a:t> AND rtp:95”</a:t>
+            </a:r>
+          </a:p>
+          <a:p>
+            <a:pPr marL="457200" lvl="1" indent="0">
+              <a:buNone/>
+            </a:pPr>
+            <a:r>
+              <a:rPr lang="en-US" dirty="0"/>
+              <a:t>	</a:t>
+            </a:r>
+            <a:r>
+              <a:rPr lang="en-US" dirty="0" smtClean="0"/>
+              <a:t>	}</a:t>
+            </a:r>
+          </a:p>
+          <a:p>
+            <a:pPr marL="457200" lvl="1" indent="0">
+              <a:buNone/>
+            </a:pPr>
+            <a:r>
+              <a:rPr lang="en-US" dirty="0" smtClean="0"/>
+              <a:t>	}</a:t>
+            </a:r>
+          </a:p>
+          <a:p>
+            <a:pPr marL="457200" lvl="1" indent="0">
+              <a:buNone/>
+            </a:pPr>
+            <a:r>
+              <a:rPr lang="en-US" dirty="0" smtClean="0"/>
+              <a:t>}`</a:t>
+            </a:r>
+            <a:endParaRPr lang="en-US" dirty="0"/>
+          </a:p>
+          <a:p>
             <a:endParaRPr lang="en-US" dirty="0"/>
           </a:p>
         </p:txBody>
@@ -6156,7 +6174,7 @@
     </p:spTree>
     <p:extLst>
       <p:ext uri="{BB962C8B-B14F-4D97-AF65-F5344CB8AC3E}">
-        <p14:creationId xmlns:p14="http://schemas.microsoft.com/office/powerpoint/2010/main" val="2580380204"/>
+        <p14:creationId xmlns:p14="http://schemas.microsoft.com/office/powerpoint/2010/main" val="1726973554"/>
       </p:ext>
     </p:extLst>
   </p:cSld>
@@ -6200,6 +6218,102 @@
           <a:p>
             <a:r>
               <a:rPr lang="en-US" dirty="0" smtClean="0"/>
+              <a:t>Query your data</a:t>
+            </a:r>
+            <a:endParaRPr lang="en-US" dirty="0"/>
+          </a:p>
+        </p:txBody>
+      </p:sp>
+      <p:sp>
+        <p:nvSpPr>
+          <p:cNvPr id="3" name="Content Placeholder 2"/>
+          <p:cNvSpPr>
+            <a:spLocks noGrp="1"/>
+          </p:cNvSpPr>
+          <p:nvPr>
+            <p:ph sz="quarter" idx="13"/>
+          </p:nvPr>
+        </p:nvSpPr>
+        <p:spPr/>
+        <p:txBody>
+          <a:bodyPr/>
+          <a:lstStyle/>
+          <a:p>
+            <a:r>
+              <a:rPr lang="en-US" dirty="0" smtClean="0"/>
+              <a:t>Query format – JSON</a:t>
+            </a:r>
+          </a:p>
+          <a:p>
+            <a:r>
+              <a:rPr lang="en-US" dirty="0" smtClean="0"/>
+              <a:t>Build in filters</a:t>
+            </a:r>
+          </a:p>
+          <a:p>
+            <a:r>
+              <a:rPr lang="en-US" dirty="0" smtClean="0"/>
+              <a:t>Queries </a:t>
+            </a:r>
+            <a:r>
+              <a:rPr lang="en-US" dirty="0" err="1" smtClean="0"/>
+              <a:t>vs</a:t>
+            </a:r>
+            <a:r>
+              <a:rPr lang="en-US" dirty="0" smtClean="0"/>
+              <a:t> Filters</a:t>
+            </a:r>
+            <a:endParaRPr lang="en-US" dirty="0"/>
+          </a:p>
+        </p:txBody>
+      </p:sp>
+    </p:spTree>
+    <p:extLst>
+      <p:ext uri="{BB962C8B-B14F-4D97-AF65-F5344CB8AC3E}">
+        <p14:creationId xmlns:p14="http://schemas.microsoft.com/office/powerpoint/2010/main" val="2580380204"/>
+      </p:ext>
+    </p:extLst>
+  </p:cSld>
+  <p:clrMapOvr>
+    <a:masterClrMapping/>
+  </p:clrMapOvr>
+</p:sld>
+</file>
+
+<file path=ppt/slides/slide35.xml><?xml version="1.0" encoding="utf-8"?>
+<p:sld xmlns:a="http://schemas.openxmlformats.org/drawingml/2006/main" xmlns:r="http://schemas.openxmlformats.org/officeDocument/2006/relationships" xmlns:p="http://schemas.openxmlformats.org/presentationml/2006/main">
+  <p:cSld>
+    <p:spTree>
+      <p:nvGrpSpPr>
+        <p:cNvPr id="1" name=""/>
+        <p:cNvGrpSpPr/>
+        <p:nvPr/>
+      </p:nvGrpSpPr>
+      <p:grpSpPr>
+        <a:xfrm>
+          <a:off x="0" y="0"/>
+          <a:ext cx="0" cy="0"/>
+          <a:chOff x="0" y="0"/>
+          <a:chExt cx="0" cy="0"/>
+        </a:xfrm>
+      </p:grpSpPr>
+      <p:sp>
+        <p:nvSpPr>
+          <p:cNvPr id="2" name="Title 1"/>
+          <p:cNvSpPr>
+            <a:spLocks noGrp="1"/>
+          </p:cNvSpPr>
+          <p:nvPr>
+            <p:ph type="title"/>
+          </p:nvPr>
+        </p:nvSpPr>
+        <p:spPr/>
+        <p:txBody>
+          <a:bodyPr/>
+          <a:lstStyle/>
+          <a:p>
+            <a:r>
+              <a:rPr lang="en-US" dirty="0" smtClean="0"/>
               <a:t>ES</a:t>
             </a:r>
             <a:endParaRPr lang="en-US" dirty="0"/>
@@ -6244,7 +6358,7 @@
 </p:sld>
 </file>
 
-<file path=ppt/slides/slide35.xml><?xml version="1.0" encoding="utf-8"?>
+<file path=ppt/slides/slide36.xml><?xml version="1.0" encoding="utf-8"?>
 <p:sld xmlns:a="http://schemas.openxmlformats.org/drawingml/2006/main" xmlns:r="http://schemas.openxmlformats.org/officeDocument/2006/relationships" xmlns:p="http://schemas.openxmlformats.org/presentationml/2006/main">
   <p:cSld>
     <p:spTree>
@@ -6446,7 +6560,7 @@
           <a:p>
             <a:r>
               <a:rPr lang="en-US" dirty="0" err="1" smtClean="0"/>
-              <a:t>Solr</a:t>
+              <a:t>Lucene</a:t>
             </a:r>
             <a:endParaRPr lang="en-US" dirty="0"/>
           </a:p>

</xml_diff>